<commit_message>
- changes to text according to scheme
</commit_message>
<xml_diff>
--- a/SecurityScheme.pptx
+++ b/SecurityScheme.pptx
@@ -247,7 +247,7 @@
           <a:p>
             <a:fld id="{0942F808-32C2-4E47-ADA9-6953909E9730}" type="datetimeFigureOut">
               <a:rPr lang="en-US" smtClean="0"/>
-              <a:t>7/15/2017</a:t>
+              <a:t>11/21/2017</a:t>
             </a:fld>
             <a:endParaRPr lang="en-US"/>
           </a:p>
@@ -417,7 +417,7 @@
           <a:p>
             <a:fld id="{0942F808-32C2-4E47-ADA9-6953909E9730}" type="datetimeFigureOut">
               <a:rPr lang="en-US" smtClean="0"/>
-              <a:t>7/15/2017</a:t>
+              <a:t>11/21/2017</a:t>
             </a:fld>
             <a:endParaRPr lang="en-US"/>
           </a:p>
@@ -597,7 +597,7 @@
           <a:p>
             <a:fld id="{0942F808-32C2-4E47-ADA9-6953909E9730}" type="datetimeFigureOut">
               <a:rPr lang="en-US" smtClean="0"/>
-              <a:t>7/15/2017</a:t>
+              <a:t>11/21/2017</a:t>
             </a:fld>
             <a:endParaRPr lang="en-US"/>
           </a:p>
@@ -767,7 +767,7 @@
           <a:p>
             <a:fld id="{0942F808-32C2-4E47-ADA9-6953909E9730}" type="datetimeFigureOut">
               <a:rPr lang="en-US" smtClean="0"/>
-              <a:t>7/15/2017</a:t>
+              <a:t>11/21/2017</a:t>
             </a:fld>
             <a:endParaRPr lang="en-US"/>
           </a:p>
@@ -1013,7 +1013,7 @@
           <a:p>
             <a:fld id="{0942F808-32C2-4E47-ADA9-6953909E9730}" type="datetimeFigureOut">
               <a:rPr lang="en-US" smtClean="0"/>
-              <a:t>7/15/2017</a:t>
+              <a:t>11/21/2017</a:t>
             </a:fld>
             <a:endParaRPr lang="en-US"/>
           </a:p>
@@ -1245,7 +1245,7 @@
           <a:p>
             <a:fld id="{0942F808-32C2-4E47-ADA9-6953909E9730}" type="datetimeFigureOut">
               <a:rPr lang="en-US" smtClean="0"/>
-              <a:t>7/15/2017</a:t>
+              <a:t>11/21/2017</a:t>
             </a:fld>
             <a:endParaRPr lang="en-US"/>
           </a:p>
@@ -1612,7 +1612,7 @@
           <a:p>
             <a:fld id="{0942F808-32C2-4E47-ADA9-6953909E9730}" type="datetimeFigureOut">
               <a:rPr lang="en-US" smtClean="0"/>
-              <a:t>7/15/2017</a:t>
+              <a:t>11/21/2017</a:t>
             </a:fld>
             <a:endParaRPr lang="en-US"/>
           </a:p>
@@ -1730,7 +1730,7 @@
           <a:p>
             <a:fld id="{0942F808-32C2-4E47-ADA9-6953909E9730}" type="datetimeFigureOut">
               <a:rPr lang="en-US" smtClean="0"/>
-              <a:t>7/15/2017</a:t>
+              <a:t>11/21/2017</a:t>
             </a:fld>
             <a:endParaRPr lang="en-US"/>
           </a:p>
@@ -1825,7 +1825,7 @@
           <a:p>
             <a:fld id="{0942F808-32C2-4E47-ADA9-6953909E9730}" type="datetimeFigureOut">
               <a:rPr lang="en-US" smtClean="0"/>
-              <a:t>7/15/2017</a:t>
+              <a:t>11/21/2017</a:t>
             </a:fld>
             <a:endParaRPr lang="en-US"/>
           </a:p>
@@ -2102,7 +2102,7 @@
           <a:p>
             <a:fld id="{0942F808-32C2-4E47-ADA9-6953909E9730}" type="datetimeFigureOut">
               <a:rPr lang="en-US" smtClean="0"/>
-              <a:t>7/15/2017</a:t>
+              <a:t>11/21/2017</a:t>
             </a:fld>
             <a:endParaRPr lang="en-US"/>
           </a:p>
@@ -2355,7 +2355,7 @@
           <a:p>
             <a:fld id="{0942F808-32C2-4E47-ADA9-6953909E9730}" type="datetimeFigureOut">
               <a:rPr lang="en-US" smtClean="0"/>
-              <a:t>7/15/2017</a:t>
+              <a:t>11/21/2017</a:t>
             </a:fld>
             <a:endParaRPr lang="en-US"/>
           </a:p>
@@ -2568,7 +2568,7 @@
           <a:p>
             <a:fld id="{0942F808-32C2-4E47-ADA9-6953909E9730}" type="datetimeFigureOut">
               <a:rPr lang="en-US" smtClean="0"/>
-              <a:t>7/15/2017</a:t>
+              <a:t>11/21/2017</a:t>
             </a:fld>
             <a:endParaRPr lang="en-US"/>
           </a:p>
@@ -3016,12 +3016,12 @@
           <a:p>
             <a:pPr algn="ctr"/>
             <a:r>
-              <a:rPr lang="en-US" dirty="0" smtClean="0">
+              <a:rPr lang="ru-RU" dirty="0" smtClean="0">
                 <a:solidFill>
                   <a:schemeClr val="tx1"/>
                 </a:solidFill>
               </a:rPr>
-              <a:t>External Signal Source</a:t>
+              <a:t>ИВС</a:t>
             </a:r>
             <a:endParaRPr lang="en-US" dirty="0">
               <a:solidFill>
@@ -3131,8 +3131,8 @@
         </p:nvSpPr>
         <p:spPr>
           <a:xfrm>
-            <a:off x="4971007" y="1504605"/>
-            <a:ext cx="1413164" cy="739832"/>
+            <a:off x="4680060" y="1409011"/>
+            <a:ext cx="1995058" cy="739832"/>
           </a:xfrm>
           <a:prstGeom prst="snipRoundRect">
             <a:avLst/>
@@ -3166,12 +3166,12 @@
           <a:p>
             <a:pPr algn="ctr"/>
             <a:r>
-              <a:rPr lang="en-US" dirty="0" smtClean="0">
+              <a:rPr lang="ru-RU" dirty="0" smtClean="0">
                 <a:solidFill>
                   <a:schemeClr val="tx1"/>
                 </a:solidFill>
               </a:rPr>
-              <a:t>Interactive Scene</a:t>
+              <a:t>Интерактивная сцена</a:t>
             </a:r>
             <a:endParaRPr lang="en-US" dirty="0">
               <a:solidFill>
@@ -3193,7 +3193,7 @@
         <p:spPr>
           <a:xfrm flipH="1">
             <a:off x="5677589" y="847898"/>
-            <a:ext cx="3" cy="656707"/>
+            <a:ext cx="3" cy="561113"/>
           </a:xfrm>
           <a:prstGeom prst="straightConnector1">
             <a:avLst/>
@@ -3225,8 +3225,8 @@
         </p:nvSpPr>
         <p:spPr>
           <a:xfrm>
-            <a:off x="4971007" y="4351713"/>
-            <a:ext cx="1413164" cy="739832"/>
+            <a:off x="4987632" y="4351713"/>
+            <a:ext cx="1521233" cy="739832"/>
           </a:xfrm>
           <a:prstGeom prst="snipRoundRect">
             <a:avLst/>
@@ -3260,12 +3260,12 @@
           <a:p>
             <a:pPr algn="ctr"/>
             <a:r>
-              <a:rPr lang="en-US" dirty="0" smtClean="0">
+              <a:rPr lang="ru-RU" dirty="0" smtClean="0">
                 <a:solidFill>
                   <a:schemeClr val="tx1"/>
                 </a:solidFill>
               </a:rPr>
-              <a:t>Controller</a:t>
+              <a:t>Контроллер</a:t>
             </a:r>
             <a:endParaRPr lang="en-US" dirty="0">
               <a:solidFill>
@@ -3278,15 +3278,13 @@
       <p:cxnSp>
         <p:nvCxnSpPr>
           <p:cNvPr id="17" name="Straight Arrow Connector 16"/>
-          <p:cNvCxnSpPr>
-            <a:endCxn id="15" idx="3"/>
-          </p:cNvCxnSpPr>
+          <p:cNvCxnSpPr/>
           <p:nvPr/>
         </p:nvCxnSpPr>
         <p:spPr>
-          <a:xfrm flipH="1">
-            <a:off x="5677589" y="3250276"/>
-            <a:ext cx="1" cy="1101437"/>
+          <a:xfrm>
+            <a:off x="5677589" y="3260667"/>
+            <a:ext cx="0" cy="1091046"/>
           </a:xfrm>
           <a:prstGeom prst="straightConnector1">
             <a:avLst/>
@@ -3318,8 +3316,8 @@
         </p:nvSpPr>
         <p:spPr>
           <a:xfrm>
-            <a:off x="6966065" y="5536276"/>
-            <a:ext cx="1064030" cy="831273"/>
+            <a:off x="6547309" y="5536276"/>
+            <a:ext cx="1482786" cy="831273"/>
           </a:xfrm>
           <a:prstGeom prst="flowChartMagneticDisk">
             <a:avLst/>
@@ -3353,12 +3351,12 @@
           <a:p>
             <a:pPr algn="ctr"/>
             <a:r>
-              <a:rPr lang="en-US" dirty="0" smtClean="0">
+              <a:rPr lang="ru-RU" dirty="0" smtClean="0">
                 <a:solidFill>
                   <a:schemeClr val="tx1"/>
                 </a:solidFill>
               </a:rPr>
-              <a:t>Data Source</a:t>
+              <a:t>Хранилище данных</a:t>
             </a:r>
             <a:endParaRPr lang="en-US" dirty="0">
               <a:solidFill>
@@ -3377,7 +3375,7 @@
         <p:spPr>
           <a:xfrm>
             <a:off x="3059084" y="5727469"/>
-            <a:ext cx="1438100" cy="640080"/>
+            <a:ext cx="1928548" cy="640080"/>
           </a:xfrm>
           <a:prstGeom prst="cube">
             <a:avLst/>
@@ -3411,12 +3409,12 @@
           <a:p>
             <a:pPr algn="ctr"/>
             <a:r>
-              <a:rPr lang="en-US" dirty="0" smtClean="0">
+              <a:rPr lang="ru-RU" dirty="0" smtClean="0">
                 <a:solidFill>
                   <a:schemeClr val="tx1"/>
                 </a:solidFill>
               </a:rPr>
-              <a:t>Crypto</a:t>
+              <a:t>Шифровальщик</a:t>
             </a:r>
             <a:endParaRPr lang="en-US" dirty="0">
               <a:solidFill>
@@ -3434,8 +3432,8 @@
         </p:nvSpPr>
         <p:spPr>
           <a:xfrm>
-            <a:off x="4971007" y="2610196"/>
-            <a:ext cx="1438100" cy="640080"/>
+            <a:off x="4680060" y="2639295"/>
+            <a:ext cx="1995058" cy="640080"/>
           </a:xfrm>
           <a:prstGeom prst="cube">
             <a:avLst/>
@@ -3469,12 +3467,12 @@
           <a:p>
             <a:pPr algn="ctr"/>
             <a:r>
-              <a:rPr lang="en-US" dirty="0" smtClean="0">
+              <a:rPr lang="ru-RU" dirty="0" smtClean="0">
                 <a:solidFill>
                   <a:schemeClr val="tx1"/>
                 </a:solidFill>
               </a:rPr>
-              <a:t>Crypto</a:t>
+              <a:t>Шифровальщик</a:t>
             </a:r>
             <a:endParaRPr lang="en-US" dirty="0">
               <a:solidFill>
@@ -3494,8 +3492,8 @@
         </p:nvCxnSpPr>
         <p:spPr>
           <a:xfrm>
-            <a:off x="5677589" y="2244437"/>
-            <a:ext cx="0" cy="365759"/>
+            <a:off x="5677589" y="2148843"/>
+            <a:ext cx="0" cy="488370"/>
           </a:xfrm>
           <a:prstGeom prst="straightConnector1">
             <a:avLst/>
@@ -3530,8 +3528,8 @@
         </p:nvCxnSpPr>
         <p:spPr>
           <a:xfrm flipH="1">
-            <a:off x="3858144" y="5091545"/>
-            <a:ext cx="1819445" cy="635924"/>
+            <a:off x="4103368" y="5091545"/>
+            <a:ext cx="1644881" cy="635924"/>
           </a:xfrm>
           <a:prstGeom prst="straightConnector1">
             <a:avLst/>
@@ -3567,8 +3565,8 @@
         </p:nvCxnSpPr>
         <p:spPr>
           <a:xfrm flipV="1">
-            <a:off x="4497184" y="5951913"/>
-            <a:ext cx="2468881" cy="15586"/>
+            <a:off x="4987632" y="5951913"/>
+            <a:ext cx="1559677" cy="15586"/>
           </a:xfrm>
           <a:prstGeom prst="straightConnector1">
             <a:avLst/>
@@ -3601,8 +3599,8 @@
         </p:nvSpPr>
         <p:spPr>
           <a:xfrm>
-            <a:off x="9568985" y="4445000"/>
-            <a:ext cx="1371600" cy="774700"/>
+            <a:off x="9568984" y="4445000"/>
+            <a:ext cx="1536819" cy="774700"/>
           </a:xfrm>
           <a:prstGeom prst="flowChartMultidocument">
             <a:avLst/>
@@ -3636,12 +3634,12 @@
           <a:p>
             <a:pPr algn="ctr"/>
             <a:r>
-              <a:rPr lang="en-US" dirty="0" smtClean="0">
+              <a:rPr lang="ru-RU" dirty="0" smtClean="0">
                 <a:solidFill>
                   <a:schemeClr val="tx1"/>
                 </a:solidFill>
               </a:rPr>
-              <a:t>Sources</a:t>
+              <a:t>Источники</a:t>
             </a:r>
             <a:endParaRPr lang="en-US" dirty="0">
               <a:solidFill>
@@ -3694,12 +3692,12 @@
           <a:p>
             <a:pPr algn="ctr"/>
             <a:r>
-              <a:rPr lang="en-US" dirty="0" smtClean="0">
+              <a:rPr lang="ru-RU" dirty="0" smtClean="0">
                 <a:solidFill>
                   <a:schemeClr val="tx1"/>
                 </a:solidFill>
               </a:rPr>
-              <a:t>Patterns</a:t>
+              <a:t>Шаблоны</a:t>
             </a:r>
             <a:endParaRPr lang="en-US" dirty="0">
               <a:solidFill>
@@ -3757,7 +3755,102 @@
         <p:spPr>
           <a:xfrm flipV="1">
             <a:off x="8030095" y="4832350"/>
-            <a:ext cx="1538890" cy="1119563"/>
+            <a:ext cx="1538889" cy="1119563"/>
+          </a:xfrm>
+          <a:prstGeom prst="straightConnector1">
+            <a:avLst/>
+          </a:prstGeom>
+          <a:ln>
+            <a:tailEnd type="triangle"/>
+          </a:ln>
+        </p:spPr>
+        <p:style>
+          <a:lnRef idx="1">
+            <a:schemeClr val="accent1"/>
+          </a:lnRef>
+          <a:fillRef idx="0">
+            <a:schemeClr val="accent1"/>
+          </a:fillRef>
+          <a:effectRef idx="0">
+            <a:schemeClr val="accent1"/>
+          </a:effectRef>
+          <a:fontRef idx="minor">
+            <a:schemeClr val="tx1"/>
+          </a:fontRef>
+        </p:style>
+      </p:cxnSp>
+      <p:sp>
+        <p:nvSpPr>
+          <p:cNvPr id="3" name="TextBox 2"/>
+          <p:cNvSpPr txBox="1"/>
+          <p:nvPr/>
+        </p:nvSpPr>
+        <p:spPr>
+          <a:xfrm>
+            <a:off x="7942807" y="2244437"/>
+            <a:ext cx="955963" cy="369332"/>
+          </a:xfrm>
+          <a:prstGeom prst="rect">
+            <a:avLst/>
+          </a:prstGeom>
+          <a:noFill/>
+        </p:spPr>
+        <p:txBody>
+          <a:bodyPr wrap="square" rtlCol="0">
+            <a:spAutoFit/>
+          </a:bodyPr>
+          <a:lstStyle/>
+          <a:p>
+            <a:r>
+              <a:rPr lang="ru-RU" dirty="0" smtClean="0"/>
+              <a:t>Блок 1</a:t>
+            </a:r>
+            <a:endParaRPr lang="en-US" dirty="0"/>
+          </a:p>
+        </p:txBody>
+      </p:sp>
+      <p:sp>
+        <p:nvSpPr>
+          <p:cNvPr id="21" name="TextBox 20"/>
+          <p:cNvSpPr txBox="1"/>
+          <p:nvPr/>
+        </p:nvSpPr>
+        <p:spPr>
+          <a:xfrm>
+            <a:off x="1597077" y="5091545"/>
+            <a:ext cx="955963" cy="369332"/>
+          </a:xfrm>
+          <a:prstGeom prst="rect">
+            <a:avLst/>
+          </a:prstGeom>
+          <a:noFill/>
+        </p:spPr>
+        <p:txBody>
+          <a:bodyPr wrap="square" rtlCol="0">
+            <a:spAutoFit/>
+          </a:bodyPr>
+          <a:lstStyle/>
+          <a:p>
+            <a:r>
+              <a:rPr lang="ru-RU" dirty="0" smtClean="0"/>
+              <a:t>Блок 2</a:t>
+            </a:r>
+            <a:endParaRPr lang="en-US" dirty="0"/>
+          </a:p>
+        </p:txBody>
+      </p:sp>
+      <p:cxnSp>
+        <p:nvCxnSpPr>
+          <p:cNvPr id="35" name="Straight Arrow Connector 34"/>
+          <p:cNvCxnSpPr>
+            <a:stCxn id="15" idx="3"/>
+          </p:cNvCxnSpPr>
+          <p:nvPr/>
+        </p:nvCxnSpPr>
+        <p:spPr>
+          <a:xfrm flipV="1">
+            <a:off x="5748249" y="3279375"/>
+            <a:ext cx="1" cy="1072338"/>
           </a:xfrm>
           <a:prstGeom prst="straightConnector1">
             <a:avLst/>
@@ -3854,12 +3947,12 @@
           <a:p>
             <a:pPr algn="ctr"/>
             <a:r>
-              <a:rPr lang="en-US" dirty="0" smtClean="0">
+              <a:rPr lang="ru-RU" dirty="0" smtClean="0">
                 <a:solidFill>
                   <a:schemeClr val="tx1"/>
                 </a:solidFill>
               </a:rPr>
-              <a:t>INTERACTIVE SCENE</a:t>
+              <a:t>Интерактивная сцена</a:t>
             </a:r>
             <a:endParaRPr lang="en-US" dirty="0">
               <a:solidFill>
@@ -4023,12 +4116,12 @@
           <a:p>
             <a:pPr algn="ctr"/>
             <a:r>
-              <a:rPr lang="en-US" dirty="0" smtClean="0">
+              <a:rPr lang="ru-RU" dirty="0" smtClean="0">
                 <a:solidFill>
                   <a:schemeClr val="tx1"/>
                 </a:solidFill>
               </a:rPr>
-              <a:t>External Signal Source</a:t>
+              <a:t>ИВС</a:t>
             </a:r>
             <a:endParaRPr lang="en-US" dirty="0">
               <a:solidFill>
@@ -4082,7 +4175,7 @@
         <p:spPr>
           <a:xfrm>
             <a:off x="9733507" y="3270250"/>
-            <a:ext cx="1413164" cy="739832"/>
+            <a:ext cx="1887686" cy="739832"/>
           </a:xfrm>
           <a:prstGeom prst="snipRoundRect">
             <a:avLst/>
@@ -4116,12 +4209,12 @@
           <a:p>
             <a:pPr algn="ctr"/>
             <a:r>
-              <a:rPr lang="en-US" dirty="0" smtClean="0">
+              <a:rPr lang="ru-RU" dirty="0" smtClean="0">
                 <a:solidFill>
                   <a:schemeClr val="tx1"/>
                 </a:solidFill>
               </a:rPr>
-              <a:t>Crypto</a:t>
+              <a:t>Шифровальщик</a:t>
             </a:r>
             <a:endParaRPr lang="en-US" dirty="0">
               <a:solidFill>
@@ -4276,12 +4369,12 @@
           <a:p>
             <a:pPr algn="ctr"/>
             <a:r>
-              <a:rPr lang="en-US" dirty="0" smtClean="0">
+              <a:rPr lang="ru-RU" dirty="0" smtClean="0">
                 <a:solidFill>
                   <a:schemeClr val="tx1"/>
                 </a:solidFill>
               </a:rPr>
-              <a:t>INTERACTIVE SCENE</a:t>
+              <a:t>Интерактивная сцена</a:t>
             </a:r>
             <a:endParaRPr lang="en-US" dirty="0">
               <a:solidFill>
@@ -4450,12 +4543,12 @@
           <a:p>
             <a:pPr algn="ctr"/>
             <a:r>
-              <a:rPr lang="en-US" dirty="0" smtClean="0">
+              <a:rPr lang="ru-RU" dirty="0" smtClean="0">
                 <a:solidFill>
                   <a:schemeClr val="tx1"/>
                 </a:solidFill>
               </a:rPr>
-              <a:t>External Signal Source</a:t>
+              <a:t>ИВС</a:t>
             </a:r>
             <a:endParaRPr lang="en-US" dirty="0">
               <a:solidFill>
@@ -4509,7 +4602,7 @@
         <p:spPr>
           <a:xfrm>
             <a:off x="9733507" y="3270250"/>
-            <a:ext cx="1413164" cy="739832"/>
+            <a:ext cx="1887686" cy="739832"/>
           </a:xfrm>
           <a:prstGeom prst="snipRoundRect">
             <a:avLst/>
@@ -4543,12 +4636,12 @@
           <a:p>
             <a:pPr algn="ctr"/>
             <a:r>
-              <a:rPr lang="en-US" dirty="0" smtClean="0">
+              <a:rPr lang="ru-RU" dirty="0" smtClean="0">
                 <a:solidFill>
                   <a:schemeClr val="tx1"/>
                 </a:solidFill>
               </a:rPr>
-              <a:t>Crypto</a:t>
+              <a:t>Шифровальщик</a:t>
             </a:r>
             <a:endParaRPr lang="en-US" dirty="0">
               <a:solidFill>
@@ -4638,8 +4731,8 @@
         </p:nvSpPr>
         <p:spPr>
           <a:xfrm>
-            <a:off x="10052739" y="4806950"/>
-            <a:ext cx="774700" cy="774700"/>
+            <a:off x="10016837" y="4782012"/>
+            <a:ext cx="1330036" cy="774700"/>
           </a:xfrm>
           <a:prstGeom prst="flowChartConnector">
             <a:avLst/>
@@ -4673,12 +4766,20 @@
           <a:p>
             <a:pPr algn="ctr"/>
             <a:r>
-              <a:rPr lang="en-US" dirty="0">
+              <a:rPr lang="en-US" dirty="0" smtClean="0">
                 <a:solidFill>
                   <a:schemeClr val="tx1"/>
                 </a:solidFill>
               </a:rPr>
               <a:t>K</a:t>
+            </a:r>
+            <a:r>
+              <a:rPr lang="ru-RU" dirty="0" smtClean="0">
+                <a:solidFill>
+                  <a:schemeClr val="tx1"/>
+                </a:solidFill>
+              </a:rPr>
+              <a:t>люч</a:t>
             </a:r>
             <a:r>
               <a:rPr lang="en-US" dirty="0" smtClean="0">
@@ -4699,16 +4800,13 @@
       <p:cxnSp>
         <p:nvCxnSpPr>
           <p:cNvPr id="4" name="Straight Arrow Connector 3"/>
-          <p:cNvCxnSpPr>
-            <a:stCxn id="32" idx="1"/>
-            <a:endCxn id="10" idx="0"/>
-          </p:cNvCxnSpPr>
+          <p:cNvCxnSpPr/>
           <p:nvPr/>
         </p:nvCxnSpPr>
         <p:spPr>
           <a:xfrm>
-            <a:off x="10440089" y="4010082"/>
-            <a:ext cx="0" cy="796868"/>
+            <a:off x="10672845" y="4010082"/>
+            <a:ext cx="4505" cy="771930"/>
           </a:xfrm>
           <a:prstGeom prst="straightConnector1">
             <a:avLst/>
@@ -4851,12 +4949,12 @@
           <a:p>
             <a:pPr algn="ctr"/>
             <a:r>
-              <a:rPr lang="en-US" dirty="0" smtClean="0">
+              <a:rPr lang="ru-RU" dirty="0" smtClean="0">
                 <a:solidFill>
                   <a:schemeClr val="tx1"/>
                 </a:solidFill>
               </a:rPr>
-              <a:t>Controller</a:t>
+              <a:t>Контроллер</a:t>
             </a:r>
             <a:endParaRPr lang="en-US" dirty="0">
               <a:solidFill>
@@ -4874,8 +4972,8 @@
         </p:nvSpPr>
         <p:spPr>
           <a:xfrm>
-            <a:off x="7207365" y="4355176"/>
-            <a:ext cx="1064030" cy="831273"/>
+            <a:off x="7207364" y="4355176"/>
+            <a:ext cx="1504373" cy="831273"/>
           </a:xfrm>
           <a:prstGeom prst="flowChartMagneticDisk">
             <a:avLst/>
@@ -4909,12 +5007,12 @@
           <a:p>
             <a:pPr algn="ctr"/>
             <a:r>
-              <a:rPr lang="en-US" dirty="0" smtClean="0">
+              <a:rPr lang="ru-RU" dirty="0" smtClean="0">
                 <a:solidFill>
                   <a:schemeClr val="tx1"/>
                 </a:solidFill>
               </a:rPr>
-              <a:t>Data Source</a:t>
+              <a:t>Хранилище данных</a:t>
             </a:r>
             <a:endParaRPr lang="en-US" dirty="0">
               <a:solidFill>
@@ -4932,8 +5030,8 @@
         </p:nvSpPr>
         <p:spPr>
           <a:xfrm>
-            <a:off x="3300384" y="4546369"/>
-            <a:ext cx="1438100" cy="640080"/>
+            <a:off x="2818015" y="4546369"/>
+            <a:ext cx="1914235" cy="640080"/>
           </a:xfrm>
           <a:prstGeom prst="cube">
             <a:avLst/>
@@ -4967,12 +5065,12 @@
           <a:p>
             <a:pPr algn="ctr"/>
             <a:r>
-              <a:rPr lang="en-US" dirty="0" smtClean="0">
+              <a:rPr lang="ru-RU" dirty="0" smtClean="0">
                 <a:solidFill>
                   <a:schemeClr val="tx1"/>
                 </a:solidFill>
               </a:rPr>
-              <a:t>Crypto</a:t>
+              <a:t>Шифровальщик</a:t>
             </a:r>
             <a:endParaRPr lang="en-US" dirty="0">
               <a:solidFill>
@@ -4993,8 +5091,8 @@
         </p:nvCxnSpPr>
         <p:spPr>
           <a:xfrm flipV="1">
-            <a:off x="4738484" y="4770813"/>
-            <a:ext cx="2468881" cy="15586"/>
+            <a:off x="4732250" y="4770813"/>
+            <a:ext cx="2475114" cy="15586"/>
           </a:xfrm>
           <a:prstGeom prst="straightConnector1">
             <a:avLst/>
@@ -5027,8 +5125,8 @@
         </p:nvSpPr>
         <p:spPr>
           <a:xfrm>
-            <a:off x="10447134" y="4355176"/>
-            <a:ext cx="1371600" cy="774700"/>
+            <a:off x="10319789" y="4355176"/>
+            <a:ext cx="1498945" cy="774700"/>
           </a:xfrm>
           <a:prstGeom prst="flowChartMultidocument">
             <a:avLst/>
@@ -5062,12 +5160,12 @@
           <a:p>
             <a:pPr algn="ctr"/>
             <a:r>
-              <a:rPr lang="en-US" dirty="0" smtClean="0">
+              <a:rPr lang="ru-RU" dirty="0" smtClean="0">
                 <a:solidFill>
                   <a:schemeClr val="tx1"/>
                 </a:solidFill>
               </a:rPr>
-              <a:t>Sources</a:t>
+              <a:t>Источники</a:t>
             </a:r>
             <a:endParaRPr lang="en-US" dirty="0">
               <a:solidFill>
@@ -5085,7 +5183,7 @@
         </p:nvSpPr>
         <p:spPr>
           <a:xfrm>
-            <a:off x="10447134" y="5503025"/>
+            <a:off x="10383461" y="5416550"/>
             <a:ext cx="1371600" cy="774700"/>
           </a:xfrm>
           <a:prstGeom prst="flowChartMultidocument">
@@ -5120,12 +5218,12 @@
           <a:p>
             <a:pPr algn="ctr"/>
             <a:r>
-              <a:rPr lang="en-US" dirty="0" smtClean="0">
+              <a:rPr lang="ru-RU" dirty="0" smtClean="0">
                 <a:solidFill>
                   <a:schemeClr val="tx1"/>
                 </a:solidFill>
               </a:rPr>
-              <a:t>Patterns</a:t>
+              <a:t>Шаблоны</a:t>
             </a:r>
             <a:endParaRPr lang="en-US" dirty="0">
               <a:solidFill>
@@ -5147,7 +5245,7 @@
         <p:spPr>
           <a:xfrm flipH="1">
             <a:off x="5854700" y="1580227"/>
-            <a:ext cx="689" cy="602154"/>
+            <a:ext cx="5773" cy="602154"/>
           </a:xfrm>
           <a:prstGeom prst="straightConnector1">
             <a:avLst/>
@@ -5179,8 +5277,8 @@
         </p:nvSpPr>
         <p:spPr>
           <a:xfrm>
-            <a:off x="5407192" y="716627"/>
-            <a:ext cx="896393" cy="863600"/>
+            <a:off x="5278582" y="716627"/>
+            <a:ext cx="1163782" cy="863600"/>
           </a:xfrm>
           <a:prstGeom prst="ellipse">
             <a:avLst/>
@@ -5214,12 +5312,20 @@
           <a:p>
             <a:pPr algn="ctr"/>
             <a:r>
-              <a:rPr lang="en-US" dirty="0">
+              <a:rPr lang="en-US" dirty="0" smtClean="0">
                 <a:solidFill>
                   <a:schemeClr val="tx1"/>
                 </a:solidFill>
               </a:rPr>
               <a:t>K</a:t>
+            </a:r>
+            <a:r>
+              <a:rPr lang="ru-RU" dirty="0" smtClean="0">
+                <a:solidFill>
+                  <a:schemeClr val="tx1"/>
+                </a:solidFill>
+              </a:rPr>
+              <a:t>люч</a:t>
             </a:r>
             <a:r>
               <a:rPr lang="en-US" dirty="0" smtClean="0">
@@ -5248,8 +5354,8 @@
         </p:nvCxnSpPr>
         <p:spPr>
           <a:xfrm flipH="1">
-            <a:off x="8271395" y="4742526"/>
-            <a:ext cx="2175739" cy="28287"/>
+            <a:off x="8711737" y="4742526"/>
+            <a:ext cx="1608052" cy="28287"/>
           </a:xfrm>
           <a:prstGeom prst="straightConnector1">
             <a:avLst/>
@@ -5321,7 +5427,55 @@
                   <a:schemeClr val="tx1"/>
                 </a:solidFill>
               </a:rPr>
-              <a:t>K == K’</a:t>
+              <a:t>K</a:t>
+            </a:r>
+            <a:r>
+              <a:rPr lang="ru-RU" dirty="0" smtClean="0">
+                <a:solidFill>
+                  <a:schemeClr val="tx1"/>
+                </a:solidFill>
+              </a:rPr>
+              <a:t>люч</a:t>
+            </a:r>
+            <a:r>
+              <a:rPr lang="en-US" dirty="0" smtClean="0">
+                <a:solidFill>
+                  <a:schemeClr val="tx1"/>
+                </a:solidFill>
+              </a:rPr>
+              <a:t> </a:t>
+            </a:r>
+            <a:r>
+              <a:rPr lang="en-US" dirty="0" smtClean="0">
+                <a:solidFill>
+                  <a:schemeClr val="tx1"/>
+                </a:solidFill>
+              </a:rPr>
+              <a:t>== </a:t>
+            </a:r>
+            <a:r>
+              <a:rPr lang="en-US" dirty="0" smtClean="0">
+                <a:solidFill>
+                  <a:schemeClr val="tx1"/>
+                </a:solidFill>
+              </a:rPr>
+              <a:t>K</a:t>
+            </a:r>
+            <a:r>
+              <a:rPr lang="ru-RU" dirty="0" smtClean="0">
+                <a:solidFill>
+                  <a:schemeClr val="tx1"/>
+                </a:solidFill>
+              </a:rPr>
+              <a:t>люч</a:t>
+            </a:r>
+            <a:r>
+              <a:rPr lang="en-US" dirty="0" smtClean="0">
+                <a:solidFill>
+                  <a:schemeClr val="tx1"/>
+                </a:solidFill>
+              </a:rPr>
+              <a:t>’</a:t>
             </a:r>
             <a:endParaRPr lang="en-US" dirty="0">
               <a:solidFill>
@@ -5342,8 +5496,8 @@
         </p:nvCxnSpPr>
         <p:spPr>
           <a:xfrm flipH="1">
-            <a:off x="4099444" y="3881351"/>
-            <a:ext cx="1755256" cy="665018"/>
+            <a:off x="3855143" y="3881351"/>
+            <a:ext cx="1999557" cy="665018"/>
           </a:xfrm>
           <a:prstGeom prst="straightConnector1">
             <a:avLst/>
@@ -5486,8 +5640,8 @@
         </p:nvSpPr>
         <p:spPr>
           <a:xfrm>
-            <a:off x="5179868" y="5565140"/>
-            <a:ext cx="1413164" cy="739832"/>
+            <a:off x="4821381" y="5565140"/>
+            <a:ext cx="2125519" cy="739832"/>
           </a:xfrm>
           <a:prstGeom prst="snipRoundRect">
             <a:avLst/>
@@ -5521,14 +5675,120 @@
           <a:p>
             <a:pPr algn="ctr"/>
             <a:r>
+              <a:rPr lang="ru-RU" dirty="0" smtClean="0">
+                <a:solidFill>
+                  <a:schemeClr val="tx1"/>
+                </a:solidFill>
+              </a:rPr>
+              <a:t>Интерактивная сцена</a:t>
+            </a:r>
+            <a:endParaRPr lang="en-US" dirty="0">
+              <a:solidFill>
+                <a:schemeClr val="tx1"/>
+              </a:solidFill>
+            </a:endParaRPr>
+          </a:p>
+        </p:txBody>
+      </p:sp>
+      <p:sp>
+        <p:nvSpPr>
+          <p:cNvPr id="2" name="Diamond 1"/>
+          <p:cNvSpPr/>
+          <p:nvPr/>
+        </p:nvSpPr>
+        <p:spPr>
+          <a:xfrm>
+            <a:off x="2562369" y="1077711"/>
+            <a:ext cx="3530311" cy="1117600"/>
+          </a:xfrm>
+          <a:prstGeom prst="diamond">
+            <a:avLst/>
+          </a:prstGeom>
+          <a:solidFill>
+            <a:schemeClr val="accent1">
+              <a:lumMod val="20000"/>
+              <a:lumOff val="80000"/>
+            </a:schemeClr>
+          </a:solidFill>
+        </p:spPr>
+        <p:style>
+          <a:lnRef idx="2">
+            <a:schemeClr val="accent1">
+              <a:shade val="50000"/>
+            </a:schemeClr>
+          </a:lnRef>
+          <a:fillRef idx="1">
+            <a:schemeClr val="accent1"/>
+          </a:fillRef>
+          <a:effectRef idx="0">
+            <a:schemeClr val="accent1"/>
+          </a:effectRef>
+          <a:fontRef idx="minor">
+            <a:schemeClr val="lt1"/>
+          </a:fontRef>
+        </p:style>
+        <p:txBody>
+          <a:bodyPr rtlCol="0" anchor="ctr"/>
+          <a:lstStyle/>
+          <a:p>
+            <a:pPr algn="ctr"/>
+            <a:r>
               <a:rPr lang="en-US" dirty="0" smtClean="0">
                 <a:solidFill>
                   <a:schemeClr val="tx1"/>
                 </a:solidFill>
               </a:rPr>
-              <a:t>Interactive Scene</a:t>
-            </a:r>
-            <a:endParaRPr lang="en-US" dirty="0">
+              <a:t>K</a:t>
+            </a:r>
+            <a:r>
+              <a:rPr lang="ru-RU" dirty="0" smtClean="0">
+                <a:solidFill>
+                  <a:schemeClr val="tx1"/>
+                </a:solidFill>
+              </a:rPr>
+              <a:t>люч</a:t>
+            </a:r>
+            <a:r>
+              <a:rPr lang="en-US" dirty="0" smtClean="0">
+                <a:solidFill>
+                  <a:schemeClr val="tx1"/>
+                </a:solidFill>
+              </a:rPr>
+              <a:t> </a:t>
+            </a:r>
+            <a:r>
+              <a:rPr lang="en-US" dirty="0" smtClean="0">
+                <a:solidFill>
+                  <a:schemeClr val="tx1"/>
+                </a:solidFill>
+              </a:rPr>
+              <a:t>== </a:t>
+            </a:r>
+            <a:r>
+              <a:rPr lang="en-US" dirty="0" smtClean="0">
+                <a:solidFill>
+                  <a:schemeClr val="tx1"/>
+                </a:solidFill>
+              </a:rPr>
+              <a:t>K</a:t>
+            </a:r>
+            <a:r>
+              <a:rPr lang="ru-RU" dirty="0" smtClean="0">
+                <a:solidFill>
+                  <a:schemeClr val="tx1"/>
+                </a:solidFill>
+              </a:rPr>
+              <a:t>люч</a:t>
+            </a:r>
+            <a:r>
+              <a:rPr lang="en-US" dirty="0" smtClean="0">
+                <a:solidFill>
+                  <a:schemeClr val="tx1"/>
+                </a:solidFill>
+              </a:rPr>
+              <a:t>’</a:t>
+            </a:r>
+            <a:endParaRPr lang="en-US" dirty="0" smtClean="0">
               <a:solidFill>
                 <a:schemeClr val="tx1"/>
               </a:solidFill>
@@ -5538,23 +5798,20 @@
       </p:sp>
       <p:sp>
         <p:nvSpPr>
-          <p:cNvPr id="2" name="Diamond 1"/>
+          <p:cNvPr id="3" name="Snip Single Corner Rectangle 2"/>
           <p:cNvSpPr/>
           <p:nvPr/>
         </p:nvSpPr>
         <p:spPr>
           <a:xfrm>
-            <a:off x="3143250" y="1130300"/>
-            <a:ext cx="2082800" cy="1117600"/>
-          </a:xfrm>
-          <a:prstGeom prst="diamond">
+            <a:off x="3035300" y="2826674"/>
+            <a:ext cx="5778499" cy="1491326"/>
+          </a:xfrm>
+          <a:prstGeom prst="snip1Rect">
             <a:avLst/>
           </a:prstGeom>
           <a:solidFill>
-            <a:schemeClr val="accent1">
-              <a:lumMod val="20000"/>
-              <a:lumOff val="80000"/>
-            </a:schemeClr>
+            <a:schemeClr val="bg2"/>
           </a:solidFill>
         </p:spPr>
         <p:style>
@@ -5574,38 +5831,40 @@
           </a:fontRef>
         </p:style>
         <p:txBody>
-          <a:bodyPr rtlCol="0" anchor="ctr"/>
+          <a:bodyPr rtlCol="0" anchor="t"/>
           <a:lstStyle/>
           <a:p>
             <a:pPr algn="ctr"/>
             <a:r>
-              <a:rPr lang="en-US" dirty="0" smtClean="0">
+              <a:rPr lang="ru-RU" dirty="0" smtClean="0">
                 <a:solidFill>
                   <a:schemeClr val="tx1"/>
                 </a:solidFill>
               </a:rPr>
-              <a:t>K == K’</a:t>
-            </a:r>
-          </a:p>
-        </p:txBody>
-      </p:sp>
-      <p:sp>
-        <p:nvSpPr>
-          <p:cNvPr id="3" name="Snip Single Corner Rectangle 2"/>
+              <a:t>Триггер</a:t>
+            </a:r>
+            <a:endParaRPr lang="en-US" dirty="0" smtClean="0">
+              <a:solidFill>
+                <a:schemeClr val="tx1"/>
+              </a:solidFill>
+            </a:endParaRPr>
+          </a:p>
+        </p:txBody>
+      </p:sp>
+      <p:sp>
+        <p:nvSpPr>
+          <p:cNvPr id="24" name="Oval 23"/>
           <p:cNvSpPr/>
           <p:nvPr/>
         </p:nvSpPr>
         <p:spPr>
           <a:xfrm>
-            <a:off x="3035300" y="2826674"/>
-            <a:ext cx="5778499" cy="1491326"/>
-          </a:xfrm>
-          <a:prstGeom prst="snip1Rect">
-            <a:avLst/>
-          </a:prstGeom>
-          <a:solidFill>
-            <a:schemeClr val="bg2"/>
-          </a:solidFill>
+            <a:off x="3429000" y="3200400"/>
+            <a:ext cx="1797050" cy="838200"/>
+          </a:xfrm>
+          <a:prstGeom prst="ellipse">
+            <a:avLst/>
+          </a:prstGeom>
         </p:spPr>
         <p:style>
           <a:lnRef idx="2">
@@ -5624,30 +5883,31 @@
           </a:fontRef>
         </p:style>
         <p:txBody>
-          <a:bodyPr rtlCol="0" anchor="t"/>
+          <a:bodyPr rtlCol="0" anchor="ctr"/>
           <a:lstStyle/>
           <a:p>
             <a:pPr algn="ctr"/>
             <a:r>
-              <a:rPr lang="en-US" dirty="0" smtClean="0">
-                <a:solidFill>
-                  <a:schemeClr val="tx1"/>
-                </a:solidFill>
-              </a:rPr>
-              <a:t>Trigger</a:t>
-            </a:r>
-          </a:p>
-        </p:txBody>
-      </p:sp>
-      <p:sp>
-        <p:nvSpPr>
-          <p:cNvPr id="24" name="Oval 23"/>
+              <a:rPr lang="ru-RU" dirty="0" smtClean="0"/>
+              <a:t>Разрешить</a:t>
+            </a:r>
+            <a:r>
+              <a:rPr lang="en-US" dirty="0" smtClean="0"/>
+              <a:t> </a:t>
+            </a:r>
+            <a:endParaRPr lang="en-US" dirty="0"/>
+          </a:p>
+        </p:txBody>
+      </p:sp>
+      <p:sp>
+        <p:nvSpPr>
+          <p:cNvPr id="29" name="Oval 28"/>
           <p:cNvSpPr/>
           <p:nvPr/>
         </p:nvSpPr>
         <p:spPr>
           <a:xfrm>
-            <a:off x="3429000" y="3200400"/>
+            <a:off x="6946901" y="3200400"/>
             <a:ext cx="1511300" cy="838200"/>
           </a:xfrm>
           <a:prstGeom prst="ellipse">
@@ -5676,52 +5936,12 @@
           <a:p>
             <a:pPr algn="ctr"/>
             <a:r>
+              <a:rPr lang="ru-RU" dirty="0" smtClean="0"/>
+              <a:t>Ожидать</a:t>
+            </a:r>
+            <a:r>
               <a:rPr lang="en-US" dirty="0" smtClean="0"/>
-              <a:t>Allow </a:t>
-            </a:r>
-            <a:endParaRPr lang="en-US" dirty="0"/>
-          </a:p>
-        </p:txBody>
-      </p:sp>
-      <p:sp>
-        <p:nvSpPr>
-          <p:cNvPr id="29" name="Oval 28"/>
-          <p:cNvSpPr/>
-          <p:nvPr/>
-        </p:nvSpPr>
-        <p:spPr>
-          <a:xfrm>
-            <a:off x="6946901" y="3200400"/>
-            <a:ext cx="1511300" cy="838200"/>
-          </a:xfrm>
-          <a:prstGeom prst="ellipse">
-            <a:avLst/>
-          </a:prstGeom>
-        </p:spPr>
-        <p:style>
-          <a:lnRef idx="2">
-            <a:schemeClr val="accent1">
-              <a:shade val="50000"/>
-            </a:schemeClr>
-          </a:lnRef>
-          <a:fillRef idx="1">
-            <a:schemeClr val="accent1"/>
-          </a:fillRef>
-          <a:effectRef idx="0">
-            <a:schemeClr val="accent1"/>
-          </a:effectRef>
-          <a:fontRef idx="minor">
-            <a:schemeClr val="lt1"/>
-          </a:fontRef>
-        </p:style>
-        <p:txBody>
-          <a:bodyPr rtlCol="0" anchor="ctr"/>
-          <a:lstStyle/>
-          <a:p>
-            <a:pPr algn="ctr"/>
-            <a:r>
-              <a:rPr lang="en-US" dirty="0" smtClean="0"/>
-              <a:t>Wait </a:t>
+              <a:t> </a:t>
             </a:r>
             <a:endParaRPr lang="en-US" dirty="0"/>
           </a:p>
@@ -5738,8 +5958,8 @@
         </p:nvCxnSpPr>
         <p:spPr>
           <a:xfrm>
-            <a:off x="5226050" y="1689100"/>
-            <a:ext cx="2476501" cy="1511300"/>
+            <a:off x="6092680" y="1636511"/>
+            <a:ext cx="1609871" cy="1563889"/>
           </a:xfrm>
           <a:prstGeom prst="straightConnector1">
             <a:avLst/>
@@ -5774,8 +5994,8 @@
         </p:nvCxnSpPr>
         <p:spPr>
           <a:xfrm>
-            <a:off x="4184650" y="2247900"/>
-            <a:ext cx="0" cy="952500"/>
+            <a:off x="4327525" y="2195311"/>
+            <a:ext cx="0" cy="1005089"/>
           </a:xfrm>
           <a:prstGeom prst="straightConnector1">
             <a:avLst/>
@@ -5870,8 +6090,8 @@
         </p:nvCxnSpPr>
         <p:spPr>
           <a:xfrm>
-            <a:off x="4184650" y="4038600"/>
-            <a:ext cx="1701800" cy="1526540"/>
+            <a:off x="4327525" y="4038600"/>
+            <a:ext cx="1556616" cy="1526540"/>
           </a:xfrm>
           <a:prstGeom prst="straightConnector1">
             <a:avLst/>
@@ -5906,8 +6126,8 @@
         </p:nvCxnSpPr>
         <p:spPr>
           <a:xfrm flipH="1">
-            <a:off x="5886450" y="4038600"/>
-            <a:ext cx="1816101" cy="1526540"/>
+            <a:off x="5884141" y="4038600"/>
+            <a:ext cx="1818410" cy="1526540"/>
           </a:xfrm>
           <a:prstGeom prst="straightConnector1">
             <a:avLst/>

</xml_diff>